<commit_message>
Create new, Update and Resize ppts
</commit_message>
<xml_diff>
--- a/你是王.pptx
+++ b/你是王.pptx
@@ -7,7 +7,7 @@
   <p:sldIdLst>
     <p:sldId id="256" r:id="rId2"/>
   </p:sldIdLst>
-  <p:sldSz cx="9144000" cy="6858000" type="screen4x3"/>
+  <p:sldSz cx="9144000" cy="5143500" type="screen16x9"/>
   <p:notesSz cx="6858000" cy="9144000"/>
   <p:defaultTextStyle>
     <a:defPPr>
@@ -136,8 +136,8 @@
         </p:nvSpPr>
         <p:spPr>
           <a:xfrm>
-            <a:off x="685800" y="2130425"/>
-            <a:ext cx="7772400" cy="1470025"/>
+            <a:off x="685800" y="1597819"/>
+            <a:ext cx="7772400" cy="1102519"/>
           </a:xfrm>
         </p:spPr>
         <p:txBody>
@@ -164,8 +164,8 @@
         </p:nvSpPr>
         <p:spPr>
           <a:xfrm>
-            <a:off x="1371600" y="3886200"/>
-            <a:ext cx="6400800" cy="1752600"/>
+            <a:off x="1371600" y="2914650"/>
+            <a:ext cx="6400800" cy="1314450"/>
           </a:xfrm>
         </p:spPr>
         <p:txBody>
@@ -289,7 +289,7 @@
             <a:fld id="{505C1DF9-CE24-4975-BF9D-C60A005B3778}" type="datetimeFigureOut">
               <a:rPr lang="en-US" smtClean="0"/>
               <a:pPr/>
-              <a:t>9/16/2017</a:t>
+              <a:t>7/20/2019</a:t>
             </a:fld>
             <a:endParaRPr lang="en-US"/>
           </a:p>
@@ -456,7 +456,7 @@
             <a:fld id="{505C1DF9-CE24-4975-BF9D-C60A005B3778}" type="datetimeFigureOut">
               <a:rPr lang="en-US" smtClean="0"/>
               <a:pPr/>
-              <a:t>9/16/2017</a:t>
+              <a:t>7/20/2019</a:t>
             </a:fld>
             <a:endParaRPr lang="en-US"/>
           </a:p>
@@ -542,8 +542,8 @@
         </p:nvSpPr>
         <p:spPr>
           <a:xfrm>
-            <a:off x="6629400" y="274638"/>
-            <a:ext cx="2057400" cy="5851525"/>
+            <a:off x="6629400" y="205979"/>
+            <a:ext cx="2057400" cy="4388644"/>
           </a:xfrm>
         </p:spPr>
         <p:txBody>
@@ -570,8 +570,8 @@
         </p:nvSpPr>
         <p:spPr>
           <a:xfrm>
-            <a:off x="457200" y="274638"/>
-            <a:ext cx="6019800" cy="5851525"/>
+            <a:off x="457200" y="205979"/>
+            <a:ext cx="6019800" cy="4388644"/>
           </a:xfrm>
         </p:spPr>
         <p:txBody>
@@ -633,7 +633,7 @@
             <a:fld id="{505C1DF9-CE24-4975-BF9D-C60A005B3778}" type="datetimeFigureOut">
               <a:rPr lang="en-US" smtClean="0"/>
               <a:pPr/>
-              <a:t>9/16/2017</a:t>
+              <a:t>7/20/2019</a:t>
             </a:fld>
             <a:endParaRPr lang="en-US"/>
           </a:p>
@@ -800,7 +800,7 @@
             <a:fld id="{505C1DF9-CE24-4975-BF9D-C60A005B3778}" type="datetimeFigureOut">
               <a:rPr lang="en-US" smtClean="0"/>
               <a:pPr/>
-              <a:t>9/16/2017</a:t>
+              <a:t>7/20/2019</a:t>
             </a:fld>
             <a:endParaRPr lang="en-US"/>
           </a:p>
@@ -886,8 +886,8 @@
         </p:nvSpPr>
         <p:spPr>
           <a:xfrm>
-            <a:off x="722313" y="4406900"/>
-            <a:ext cx="7772400" cy="1362075"/>
+            <a:off x="722313" y="3305176"/>
+            <a:ext cx="7772400" cy="1021556"/>
           </a:xfrm>
         </p:spPr>
         <p:txBody>
@@ -918,8 +918,8 @@
         </p:nvSpPr>
         <p:spPr>
           <a:xfrm>
-            <a:off x="722313" y="2906713"/>
-            <a:ext cx="7772400" cy="1500187"/>
+            <a:off x="722313" y="2180035"/>
+            <a:ext cx="7772400" cy="1125140"/>
           </a:xfrm>
         </p:spPr>
         <p:txBody>
@@ -1043,7 +1043,7 @@
             <a:fld id="{505C1DF9-CE24-4975-BF9D-C60A005B3778}" type="datetimeFigureOut">
               <a:rPr lang="en-US" smtClean="0"/>
               <a:pPr/>
-              <a:t>9/16/2017</a:t>
+              <a:t>7/20/2019</a:t>
             </a:fld>
             <a:endParaRPr lang="en-US"/>
           </a:p>
@@ -1152,8 +1152,8 @@
         </p:nvSpPr>
         <p:spPr>
           <a:xfrm>
-            <a:off x="457200" y="1600200"/>
-            <a:ext cx="4038600" cy="4525963"/>
+            <a:off x="457200" y="1200151"/>
+            <a:ext cx="4038600" cy="3394472"/>
           </a:xfrm>
         </p:spPr>
         <p:txBody>
@@ -1237,8 +1237,8 @@
         </p:nvSpPr>
         <p:spPr>
           <a:xfrm>
-            <a:off x="4648200" y="1600200"/>
-            <a:ext cx="4038600" cy="4525963"/>
+            <a:off x="4648200" y="1200151"/>
+            <a:ext cx="4038600" cy="3394472"/>
           </a:xfrm>
         </p:spPr>
         <p:txBody>
@@ -1328,7 +1328,7 @@
             <a:fld id="{505C1DF9-CE24-4975-BF9D-C60A005B3778}" type="datetimeFigureOut">
               <a:rPr lang="en-US" smtClean="0"/>
               <a:pPr/>
-              <a:t>9/16/2017</a:t>
+              <a:t>7/20/2019</a:t>
             </a:fld>
             <a:endParaRPr lang="en-US"/>
           </a:p>
@@ -1441,8 +1441,8 @@
         </p:nvSpPr>
         <p:spPr>
           <a:xfrm>
-            <a:off x="457200" y="1535113"/>
-            <a:ext cx="4040188" cy="639762"/>
+            <a:off x="457200" y="1151335"/>
+            <a:ext cx="4040188" cy="479822"/>
           </a:xfrm>
         </p:spPr>
         <p:txBody>
@@ -1506,8 +1506,8 @@
         </p:nvSpPr>
         <p:spPr>
           <a:xfrm>
-            <a:off x="457200" y="2174875"/>
-            <a:ext cx="4040188" cy="3951288"/>
+            <a:off x="457200" y="1631156"/>
+            <a:ext cx="4040188" cy="2963466"/>
           </a:xfrm>
         </p:spPr>
         <p:txBody>
@@ -1591,8 +1591,8 @@
         </p:nvSpPr>
         <p:spPr>
           <a:xfrm>
-            <a:off x="4645025" y="1535113"/>
-            <a:ext cx="4041775" cy="639762"/>
+            <a:off x="4645026" y="1151335"/>
+            <a:ext cx="4041775" cy="479822"/>
           </a:xfrm>
         </p:spPr>
         <p:txBody>
@@ -1656,8 +1656,8 @@
         </p:nvSpPr>
         <p:spPr>
           <a:xfrm>
-            <a:off x="4645025" y="2174875"/>
-            <a:ext cx="4041775" cy="3951288"/>
+            <a:off x="4645026" y="1631156"/>
+            <a:ext cx="4041775" cy="2963466"/>
           </a:xfrm>
         </p:spPr>
         <p:txBody>
@@ -1747,7 +1747,7 @@
             <a:fld id="{505C1DF9-CE24-4975-BF9D-C60A005B3778}" type="datetimeFigureOut">
               <a:rPr lang="en-US" smtClean="0"/>
               <a:pPr/>
-              <a:t>9/16/2017</a:t>
+              <a:t>7/20/2019</a:t>
             </a:fld>
             <a:endParaRPr lang="en-US"/>
           </a:p>
@@ -1862,7 +1862,7 @@
             <a:fld id="{505C1DF9-CE24-4975-BF9D-C60A005B3778}" type="datetimeFigureOut">
               <a:rPr lang="en-US" smtClean="0"/>
               <a:pPr/>
-              <a:t>9/16/2017</a:t>
+              <a:t>7/20/2019</a:t>
             </a:fld>
             <a:endParaRPr lang="en-US"/>
           </a:p>
@@ -1954,7 +1954,7 @@
             <a:fld id="{505C1DF9-CE24-4975-BF9D-C60A005B3778}" type="datetimeFigureOut">
               <a:rPr lang="en-US" smtClean="0"/>
               <a:pPr/>
-              <a:t>9/16/2017</a:t>
+              <a:t>7/20/2019</a:t>
             </a:fld>
             <a:endParaRPr lang="en-US"/>
           </a:p>
@@ -2040,8 +2040,8 @@
         </p:nvSpPr>
         <p:spPr>
           <a:xfrm>
-            <a:off x="457200" y="273050"/>
-            <a:ext cx="3008313" cy="1162050"/>
+            <a:off x="457201" y="204787"/>
+            <a:ext cx="3008313" cy="871538"/>
           </a:xfrm>
         </p:spPr>
         <p:txBody>
@@ -2072,8 +2072,8 @@
         </p:nvSpPr>
         <p:spPr>
           <a:xfrm>
-            <a:off x="3575050" y="273050"/>
-            <a:ext cx="5111750" cy="5853113"/>
+            <a:off x="3575050" y="204788"/>
+            <a:ext cx="5111750" cy="4389835"/>
           </a:xfrm>
         </p:spPr>
         <p:txBody>
@@ -2157,8 +2157,8 @@
         </p:nvSpPr>
         <p:spPr>
           <a:xfrm>
-            <a:off x="457200" y="1435100"/>
-            <a:ext cx="3008313" cy="4691063"/>
+            <a:off x="457201" y="1076326"/>
+            <a:ext cx="3008313" cy="3518297"/>
           </a:xfrm>
         </p:spPr>
         <p:txBody>
@@ -2228,7 +2228,7 @@
             <a:fld id="{505C1DF9-CE24-4975-BF9D-C60A005B3778}" type="datetimeFigureOut">
               <a:rPr lang="en-US" smtClean="0"/>
               <a:pPr/>
-              <a:t>9/16/2017</a:t>
+              <a:t>7/20/2019</a:t>
             </a:fld>
             <a:endParaRPr lang="en-US"/>
           </a:p>
@@ -2314,8 +2314,8 @@
         </p:nvSpPr>
         <p:spPr>
           <a:xfrm>
-            <a:off x="1792288" y="4800600"/>
-            <a:ext cx="5486400" cy="566738"/>
+            <a:off x="1792288" y="3600450"/>
+            <a:ext cx="5486400" cy="425054"/>
           </a:xfrm>
         </p:spPr>
         <p:txBody>
@@ -2346,8 +2346,8 @@
         </p:nvSpPr>
         <p:spPr>
           <a:xfrm>
-            <a:off x="1792288" y="612775"/>
-            <a:ext cx="5486400" cy="4114800"/>
+            <a:off x="1792288" y="459581"/>
+            <a:ext cx="5486400" cy="3086100"/>
           </a:xfrm>
         </p:spPr>
         <p:txBody>
@@ -2411,8 +2411,8 @@
         </p:nvSpPr>
         <p:spPr>
           <a:xfrm>
-            <a:off x="1792288" y="5367338"/>
-            <a:ext cx="5486400" cy="804862"/>
+            <a:off x="1792288" y="4025503"/>
+            <a:ext cx="5486400" cy="603647"/>
           </a:xfrm>
         </p:spPr>
         <p:txBody>
@@ -2482,7 +2482,7 @@
             <a:fld id="{505C1DF9-CE24-4975-BF9D-C60A005B3778}" type="datetimeFigureOut">
               <a:rPr lang="en-US" smtClean="0"/>
               <a:pPr/>
-              <a:t>9/16/2017</a:t>
+              <a:t>7/20/2019</a:t>
             </a:fld>
             <a:endParaRPr lang="en-US"/>
           </a:p>
@@ -2578,8 +2578,8 @@
         </p:nvSpPr>
         <p:spPr>
           <a:xfrm>
-            <a:off x="457200" y="274638"/>
-            <a:ext cx="8229600" cy="1143000"/>
+            <a:off x="457200" y="205979"/>
+            <a:ext cx="8229600" cy="857250"/>
           </a:xfrm>
           <a:prstGeom prst="rect">
             <a:avLst/>
@@ -2611,8 +2611,8 @@
         </p:nvSpPr>
         <p:spPr>
           <a:xfrm>
-            <a:off x="457200" y="1600200"/>
-            <a:ext cx="8229600" cy="4525963"/>
+            <a:off x="457200" y="1200151"/>
+            <a:ext cx="8229600" cy="3394472"/>
           </a:xfrm>
           <a:prstGeom prst="rect">
             <a:avLst/>
@@ -2673,8 +2673,8 @@
         </p:nvSpPr>
         <p:spPr>
           <a:xfrm>
-            <a:off x="457200" y="6356350"/>
-            <a:ext cx="2133600" cy="365125"/>
+            <a:off x="457200" y="4767263"/>
+            <a:ext cx="2133600" cy="273844"/>
           </a:xfrm>
           <a:prstGeom prst="rect">
             <a:avLst/>
@@ -2697,7 +2697,7 @@
             <a:fld id="{505C1DF9-CE24-4975-BF9D-C60A005B3778}" type="datetimeFigureOut">
               <a:rPr lang="en-US" smtClean="0"/>
               <a:pPr/>
-              <a:t>9/16/2017</a:t>
+              <a:t>7/20/2019</a:t>
             </a:fld>
             <a:endParaRPr lang="en-US"/>
           </a:p>
@@ -2715,8 +2715,8 @@
         </p:nvSpPr>
         <p:spPr>
           <a:xfrm>
-            <a:off x="3124200" y="6356350"/>
-            <a:ext cx="2895600" cy="365125"/>
+            <a:off x="3124200" y="4767263"/>
+            <a:ext cx="2895600" cy="273844"/>
           </a:xfrm>
           <a:prstGeom prst="rect">
             <a:avLst/>
@@ -2752,8 +2752,8 @@
         </p:nvSpPr>
         <p:spPr>
           <a:xfrm>
-            <a:off x="6553200" y="6356350"/>
-            <a:ext cx="2133600" cy="365125"/>
+            <a:off x="6553200" y="4767263"/>
+            <a:ext cx="2133600" cy="273844"/>
           </a:xfrm>
           <a:prstGeom prst="rect">
             <a:avLst/>
@@ -3080,11 +3080,13 @@
         </p:nvSpPr>
         <p:spPr/>
         <p:txBody>
-          <a:bodyPr/>
-          <a:lstStyle/>
-          <a:p>
-            <a:r>
-              <a:rPr lang="zh-TW" altLang="en-US" b="1" dirty="0">
+          <a:bodyPr>
+            <a:normAutofit/>
+          </a:bodyPr>
+          <a:lstStyle/>
+          <a:p>
+            <a:r>
+              <a:rPr lang="zh-TW" altLang="en-US" sz="4000" b="1" dirty="0">
                 <a:solidFill>
                   <a:srgbClr val="000066"/>
                 </a:solidFill>
@@ -3093,7 +3095,7 @@
               </a:rPr>
               <a:t>你是王</a:t>
             </a:r>
-            <a:endParaRPr lang="en-US" b="1" dirty="0">
+            <a:endParaRPr lang="en-US" sz="4000" b="1" dirty="0">
               <a:solidFill>
                 <a:srgbClr val="000066"/>
               </a:solidFill>
@@ -3115,13 +3117,13 @@
         </p:nvSpPr>
         <p:spPr>
           <a:xfrm>
-            <a:off x="357158" y="1600200"/>
-            <a:ext cx="8643998" cy="4525963"/>
+            <a:off x="357158" y="1200151"/>
+            <a:ext cx="8643998" cy="3394472"/>
           </a:xfrm>
         </p:spPr>
         <p:txBody>
           <a:bodyPr>
-            <a:normAutofit/>
+            <a:noAutofit/>
           </a:bodyPr>
           <a:lstStyle/>
           <a:p>
@@ -3129,7 +3131,7 @@
               <a:buNone/>
             </a:pPr>
             <a:r>
-              <a:rPr lang="zh-TW" altLang="en-US" sz="5400" b="1" dirty="0">
+              <a:rPr lang="zh-TW" altLang="en-US" sz="4800" b="1" dirty="0">
                 <a:solidFill>
                   <a:srgbClr val="000066"/>
                 </a:solidFill>
@@ -3139,7 +3141,7 @@
               <a:t>神你極偉</a:t>
             </a:r>
             <a:r>
-              <a:rPr lang="zh-TW" altLang="en-US" sz="5400" b="1" dirty="0" smtClean="0">
+              <a:rPr lang="zh-TW" altLang="en-US" sz="4800" b="1" dirty="0" smtClean="0">
                 <a:solidFill>
                   <a:srgbClr val="000066"/>
                 </a:solidFill>
@@ -3149,7 +3151,7 @@
               <a:t>大  萬</a:t>
             </a:r>
             <a:r>
-              <a:rPr lang="zh-TW" altLang="en-US" sz="5400" b="1" dirty="0">
+              <a:rPr lang="zh-TW" altLang="en-US" sz="4800" b="1" dirty="0">
                 <a:solidFill>
                   <a:srgbClr val="000066"/>
                 </a:solidFill>
@@ -3159,7 +3161,7 @@
               <a:t>有都歸</a:t>
             </a:r>
             <a:r>
-              <a:rPr lang="zh-TW" altLang="en-US" sz="5400" b="1" dirty="0" smtClean="0">
+              <a:rPr lang="zh-TW" altLang="en-US" sz="4800" b="1" dirty="0" smtClean="0">
                 <a:solidFill>
                   <a:srgbClr val="000066"/>
                 </a:solidFill>
@@ -3168,7 +3170,7 @@
               </a:rPr>
               <a:t>你</a:t>
             </a:r>
-            <a:endParaRPr lang="en-US" altLang="zh-TW" sz="5400" b="1" dirty="0" smtClean="0">
+            <a:endParaRPr lang="en-US" altLang="zh-TW" sz="4800" b="1" dirty="0" smtClean="0">
               <a:solidFill>
                 <a:srgbClr val="000066"/>
               </a:solidFill>
@@ -3181,7 +3183,7 @@
               <a:buNone/>
             </a:pPr>
             <a:r>
-              <a:rPr lang="zh-TW" altLang="en-US" sz="5400" b="1" dirty="0" smtClean="0">
+              <a:rPr lang="zh-TW" altLang="en-US" sz="4800" b="1" dirty="0" smtClean="0">
                 <a:solidFill>
                   <a:srgbClr val="000066"/>
                 </a:solidFill>
@@ -3191,7 +3193,7 @@
               <a:t>主</a:t>
             </a:r>
             <a:r>
-              <a:rPr lang="zh-TW" altLang="en-US" sz="5400" b="1" dirty="0">
+              <a:rPr lang="zh-TW" altLang="en-US" sz="4800" b="1" dirty="0">
                 <a:solidFill>
                   <a:srgbClr val="000066"/>
                 </a:solidFill>
@@ -3201,7 +3203,7 @@
               <a:t>宰一</a:t>
             </a:r>
             <a:r>
-              <a:rPr lang="zh-TW" altLang="en-US" sz="5400" b="1" dirty="0" smtClean="0">
+              <a:rPr lang="zh-TW" altLang="en-US" sz="4800" b="1" dirty="0" smtClean="0">
                 <a:solidFill>
                   <a:srgbClr val="000066"/>
                 </a:solidFill>
@@ -3211,7 +3213,7 @@
               <a:t>切  你</a:t>
             </a:r>
             <a:r>
-              <a:rPr lang="zh-TW" altLang="en-US" sz="5400" b="1" dirty="0">
+              <a:rPr lang="zh-TW" altLang="en-US" sz="4800" b="1" dirty="0">
                 <a:solidFill>
                   <a:srgbClr val="000066"/>
                 </a:solidFill>
@@ -3221,7 +3223,7 @@
               <a:t>是</a:t>
             </a:r>
             <a:r>
-              <a:rPr lang="zh-TW" altLang="en-US" sz="5400" b="1" dirty="0" smtClean="0">
+              <a:rPr lang="zh-TW" altLang="en-US" sz="4800" b="1" dirty="0" smtClean="0">
                 <a:solidFill>
                   <a:srgbClr val="000066"/>
                 </a:solidFill>
@@ -3230,7 +3232,7 @@
               </a:rPr>
               <a:t>王</a:t>
             </a:r>
-            <a:endParaRPr lang="en-US" altLang="zh-TW" sz="5400" b="1" dirty="0">
+            <a:endParaRPr lang="en-US" altLang="zh-TW" sz="4800" b="1" dirty="0">
               <a:solidFill>
                 <a:srgbClr val="000066"/>
               </a:solidFill>
@@ -3243,7 +3245,7 @@
               <a:buNone/>
             </a:pPr>
             <a:r>
-              <a:rPr lang="zh-TW" altLang="en-US" sz="5400" b="1" dirty="0" smtClean="0">
+              <a:rPr lang="zh-TW" altLang="en-US" sz="4800" b="1" dirty="0" smtClean="0">
                 <a:solidFill>
                   <a:srgbClr val="000066"/>
                 </a:solidFill>
@@ -3253,7 +3255,7 @@
               <a:t>尊</a:t>
             </a:r>
             <a:r>
-              <a:rPr lang="zh-TW" altLang="en-US" sz="5400" b="1" dirty="0">
+              <a:rPr lang="zh-TW" altLang="en-US" sz="4800" b="1" dirty="0">
                 <a:solidFill>
                   <a:srgbClr val="000066"/>
                 </a:solidFill>
@@ -3263,7 +3265,7 @@
               <a:t>貴</a:t>
             </a:r>
             <a:r>
-              <a:rPr lang="zh-TW" altLang="en-US" sz="5400" b="1" dirty="0" smtClean="0">
+              <a:rPr lang="zh-TW" altLang="en-US" sz="4800" b="1" dirty="0" smtClean="0">
                 <a:solidFill>
                   <a:srgbClr val="000066"/>
                 </a:solidFill>
@@ -3273,7 +3275,7 @@
               <a:t>主  我</a:t>
             </a:r>
             <a:r>
-              <a:rPr lang="zh-TW" altLang="en-US" sz="5400" b="1" dirty="0">
+              <a:rPr lang="zh-TW" altLang="en-US" sz="4800" b="1" dirty="0">
                 <a:solidFill>
                   <a:srgbClr val="000066"/>
                 </a:solidFill>
@@ -3283,7 +3285,7 @@
               <a:t>景</a:t>
             </a:r>
             <a:r>
-              <a:rPr lang="zh-TW" altLang="en-US" sz="5400" b="1" dirty="0" smtClean="0">
+              <a:rPr lang="zh-TW" altLang="en-US" sz="4800" b="1" dirty="0" smtClean="0">
                 <a:solidFill>
                   <a:srgbClr val="000066"/>
                 </a:solidFill>
@@ -3292,7 +3294,7 @@
               </a:rPr>
               <a:t>仰</a:t>
             </a:r>
-            <a:endParaRPr lang="en-US" altLang="zh-TW" sz="5400" b="1" dirty="0" smtClean="0">
+            <a:endParaRPr lang="en-US" altLang="zh-TW" sz="4800" b="1" dirty="0" smtClean="0">
               <a:solidFill>
                 <a:srgbClr val="000066"/>
               </a:solidFill>
@@ -3305,7 +3307,7 @@
               <a:buNone/>
             </a:pPr>
             <a:r>
-              <a:rPr lang="zh-TW" altLang="en-US" sz="5400" b="1" dirty="0" smtClean="0">
+              <a:rPr lang="zh-TW" altLang="en-US" sz="4800" b="1" dirty="0" smtClean="0">
                 <a:solidFill>
                   <a:srgbClr val="000066"/>
                 </a:solidFill>
@@ -3315,7 +3317,7 @@
               <a:t>屈</a:t>
             </a:r>
             <a:r>
-              <a:rPr lang="zh-TW" altLang="en-US" sz="5400" b="1" dirty="0">
+              <a:rPr lang="zh-TW" altLang="en-US" sz="4800" b="1" dirty="0">
                 <a:solidFill>
                   <a:srgbClr val="000066"/>
                 </a:solidFill>
@@ -3325,7 +3327,7 @@
               <a:t>膝你</a:t>
             </a:r>
             <a:r>
-              <a:rPr lang="zh-TW" altLang="en-US" sz="5400" b="1" dirty="0" smtClean="0">
+              <a:rPr lang="zh-TW" altLang="en-US" sz="4800" b="1" dirty="0" smtClean="0">
                 <a:solidFill>
                   <a:srgbClr val="000066"/>
                 </a:solidFill>
@@ -3335,7 +3337,7 @@
               <a:t>前  讓</a:t>
             </a:r>
             <a:r>
-              <a:rPr lang="zh-TW" altLang="en-US" sz="5400" b="1" dirty="0">
+              <a:rPr lang="zh-TW" altLang="en-US" sz="4800" b="1" dirty="0">
                 <a:solidFill>
                   <a:srgbClr val="000066"/>
                 </a:solidFill>
@@ -3344,7 +3346,7 @@
               </a:rPr>
               <a:t>我頌讚你</a:t>
             </a:r>
-            <a:endParaRPr lang="en-US" sz="5400" b="1" dirty="0">
+            <a:endParaRPr lang="en-US" sz="4800" b="1" dirty="0">
               <a:solidFill>
                 <a:srgbClr val="000066"/>
               </a:solidFill>

</xml_diff>